<commit_message>
Ajout correction exercices dans README + maj presentations
</commit_message>
<xml_diff>
--- a/Postgresql.pptx
+++ b/Postgresql.pptx
@@ -5724,11 +5724,11 @@
     </p:tnLst>
     <p:bldLst>
       <p:bldP build="whole" bldLvl="1" animBg="1" rev="0" advAuto="0" spid="187" grpId="4"/>
-      <p:bldP build="whole" bldLvl="1" animBg="1" rev="0" advAuto="0" spid="184" grpId="5"/>
-      <p:bldP build="whole" bldLvl="1" animBg="1" rev="0" advAuto="0" spid="188" grpId="6"/>
-      <p:bldP build="whole" bldLvl="1" animBg="1" rev="0" advAuto="0" spid="182" grpId="3"/>
       <p:bldP build="whole" bldLvl="1" animBg="1" rev="0" advAuto="0" spid="186" grpId="2"/>
       <p:bldP build="whole" bldLvl="1" animBg="1" rev="0" advAuto="0" spid="180" grpId="1"/>
+      <p:bldP build="whole" bldLvl="1" animBg="1" rev="0" advAuto="0" spid="188" grpId="6"/>
+      <p:bldP build="whole" bldLvl="1" animBg="1" rev="0" advAuto="0" spid="184" grpId="5"/>
+      <p:bldP build="whole" bldLvl="1" animBg="1" rev="0" advAuto="0" spid="182" grpId="3"/>
     </p:bldLst>
   </p:timing>
 </p:sld>
@@ -6402,12 +6402,12 @@
       </p:par>
     </p:tnLst>
     <p:bldLst>
+      <p:bldP build="whole" bldLvl="1" animBg="1" rev="0" advAuto="0" spid="192" grpId="1"/>
+      <p:bldP build="whole" bldLvl="1" animBg="1" rev="0" advAuto="0" spid="194" grpId="5"/>
+      <p:bldP build="whole" bldLvl="1" animBg="1" rev="0" advAuto="0" spid="193" grpId="3"/>
       <p:bldP build="whole" bldLvl="1" animBg="1" rev="0" advAuto="0" spid="196" grpId="6"/>
       <p:bldP build="whole" bldLvl="1" animBg="1" rev="0" advAuto="0" spid="195" grpId="2"/>
-      <p:bldP build="whole" bldLvl="1" animBg="1" rev="0" advAuto="0" spid="193" grpId="3"/>
-      <p:bldP build="whole" bldLvl="1" animBg="1" rev="0" advAuto="0" spid="192" grpId="1"/>
       <p:bldP build="whole" bldLvl="1" animBg="1" rev="0" advAuto="0" spid="194" grpId="4"/>
-      <p:bldP build="whole" bldLvl="1" animBg="1" rev="0" advAuto="0" spid="194" grpId="5"/>
     </p:bldLst>
   </p:timing>
 </p:sld>
@@ -8003,10 +8003,10 @@
     </p:tnLst>
     <p:bldLst>
       <p:bldP build="whole" bldLvl="1" animBg="1" rev="0" advAuto="0" spid="207" grpId="5"/>
+      <p:bldP build="whole" bldLvl="1" animBg="1" rev="0" advAuto="0" spid="206" grpId="4"/>
+      <p:bldP build="whole" bldLvl="1" animBg="1" rev="0" advAuto="0" spid="205" grpId="3"/>
+      <p:bldP build="whole" bldLvl="1" animBg="1" rev="0" advAuto="0" spid="204" grpId="2"/>
       <p:bldP build="whole" bldLvl="1" animBg="1" rev="0" advAuto="0" spid="204" grpId="1"/>
-      <p:bldP build="whole" bldLvl="1" animBg="1" rev="0" advAuto="0" spid="204" grpId="2"/>
-      <p:bldP build="whole" bldLvl="1" animBg="1" rev="0" advAuto="0" spid="205" grpId="3"/>
-      <p:bldP build="whole" bldLvl="1" animBg="1" rev="0" advAuto="0" spid="206" grpId="4"/>
     </p:bldLst>
   </p:timing>
 </p:sld>
@@ -8953,8 +8953,8 @@
       </p:par>
     </p:tnLst>
     <p:bldLst>
+      <p:bldP build="whole" bldLvl="1" animBg="1" rev="0" advAuto="0" spid="215" grpId="3"/>
       <p:bldP build="whole" bldLvl="1" animBg="1" rev="0" advAuto="0" spid="213" grpId="1"/>
-      <p:bldP build="whole" bldLvl="1" animBg="1" rev="0" advAuto="0" spid="215" grpId="3"/>
       <p:bldP build="whole" bldLvl="1" animBg="1" rev="0" advAuto="0" spid="214" grpId="2"/>
     </p:bldLst>
   </p:timing>
@@ -9951,12 +9951,12 @@
       </p:par>
     </p:tnLst>
     <p:bldLst>
+      <p:bldP build="whole" bldLvl="1" animBg="1" rev="0" advAuto="0" spid="225" grpId="5"/>
       <p:bldP build="whole" bldLvl="1" animBg="1" rev="0" advAuto="0" spid="229" grpId="3"/>
+      <p:bldP build="whole" bldLvl="1" animBg="1" rev="0" advAuto="0" spid="226" grpId="1"/>
+      <p:bldP build="whole" bldLvl="1" animBg="1" rev="0" advAuto="0" spid="227" grpId="2"/>
+      <p:bldP build="whole" bldLvl="1" animBg="1" rev="0" advAuto="0" spid="224" grpId="4"/>
       <p:bldP build="whole" bldLvl="1" animBg="1" rev="0" advAuto="0" spid="230" grpId="9"/>
-      <p:bldP build="whole" bldLvl="1" animBg="1" rev="0" advAuto="0" spid="224" grpId="4"/>
-      <p:bldP build="whole" bldLvl="1" animBg="1" rev="0" advAuto="0" spid="227" grpId="2"/>
-      <p:bldP build="whole" bldLvl="1" animBg="1" rev="0" advAuto="0" spid="226" grpId="1"/>
-      <p:bldP build="whole" bldLvl="1" animBg="1" rev="0" advAuto="0" spid="225" grpId="5"/>
     </p:bldLst>
   </p:timing>
 </p:sld>
@@ -12693,16 +12693,16 @@
       </p:par>
     </p:tnLst>
     <p:bldLst>
+      <p:bldP build="whole" bldLvl="1" animBg="1" rev="0" advAuto="0" spid="247" grpId="5"/>
       <p:bldP build="whole" bldLvl="1" animBg="1" rev="0" advAuto="0" spid="240" grpId="1"/>
+      <p:bldP build="whole" bldLvl="1" animBg="1" rev="0" advAuto="0" spid="245" grpId="6"/>
       <p:bldP build="whole" bldLvl="1" animBg="1" rev="0" advAuto="0" spid="242" grpId="2"/>
       <p:bldP build="whole" bldLvl="1" animBg="1" rev="0" advAuto="0" spid="242" grpId="3"/>
-      <p:bldP build="whole" bldLvl="1" animBg="1" rev="0" advAuto="0" spid="243" grpId="4"/>
+      <p:bldP build="whole" bldLvl="1" animBg="1" rev="0" advAuto="0" spid="245" grpId="7"/>
       <p:bldP build="whole" bldLvl="1" animBg="1" rev="0" advAuto="0" spid="246" grpId="8"/>
       <p:bldP build="whole" bldLvl="1" animBg="1" rev="0" advAuto="0" spid="246" grpId="9"/>
       <p:bldP build="whole" bldLvl="1" animBg="1" rev="0" advAuto="0" spid="248" grpId="10"/>
-      <p:bldP build="whole" bldLvl="1" animBg="1" rev="0" advAuto="0" spid="245" grpId="6"/>
-      <p:bldP build="whole" bldLvl="1" animBg="1" rev="0" advAuto="0" spid="245" grpId="7"/>
-      <p:bldP build="whole" bldLvl="1" animBg="1" rev="0" advAuto="0" spid="247" grpId="5"/>
+      <p:bldP build="whole" bldLvl="1" animBg="1" rev="0" advAuto="0" spid="243" grpId="4"/>
     </p:bldLst>
   </p:timing>
 </p:sld>
@@ -16152,13 +16152,13 @@
       </p:par>
     </p:tnLst>
     <p:bldLst>
+      <p:bldP build="whole" bldLvl="1" animBg="1" rev="0" advAuto="0" spid="259" grpId="2"/>
+      <p:bldP build="whole" bldLvl="1" animBg="1" rev="0" advAuto="0" spid="263" grpId="5"/>
+      <p:bldP build="whole" bldLvl="1" animBg="1" rev="0" advAuto="0" spid="263" grpId="6"/>
       <p:bldP build="whole" bldLvl="1" animBg="1" rev="0" advAuto="0" spid="264" grpId="7"/>
+      <p:bldP build="whole" bldLvl="1" animBg="1" rev="0" advAuto="0" spid="265" grpId="4"/>
       <p:bldP build="whole" bldLvl="1" animBg="1" rev="0" advAuto="0" spid="261" grpId="3"/>
       <p:bldP build="whole" bldLvl="1" animBg="1" rev="0" advAuto="0" spid="266" grpId="1"/>
-      <p:bldP build="whole" bldLvl="1" animBg="1" rev="0" advAuto="0" spid="265" grpId="4"/>
-      <p:bldP build="whole" bldLvl="1" animBg="1" rev="0" advAuto="0" spid="263" grpId="5"/>
-      <p:bldP build="whole" bldLvl="1" animBg="1" rev="0" advAuto="0" spid="259" grpId="2"/>
-      <p:bldP build="whole" bldLvl="1" animBg="1" rev="0" advAuto="0" spid="263" grpId="6"/>
     </p:bldLst>
   </p:timing>
 </p:sld>
@@ -16962,12 +16962,12 @@
       </p:par>
     </p:tnLst>
     <p:bldLst>
+      <p:bldP build="whole" bldLvl="1" animBg="1" rev="0" advAuto="0" spid="273" grpId="2"/>
+      <p:bldP build="whole" bldLvl="1" animBg="1" rev="0" advAuto="0" spid="271" grpId="1"/>
+      <p:bldP build="whole" bldLvl="1" animBg="1" rev="0" advAuto="0" spid="276" grpId="6"/>
+      <p:bldP build="whole" bldLvl="1" animBg="1" rev="0" advAuto="0" spid="277" grpId="3"/>
+      <p:bldP build="whole" bldLvl="1" animBg="1" rev="0" advAuto="0" spid="275" grpId="4"/>
       <p:bldP build="whole" bldLvl="1" animBg="1" rev="0" advAuto="0" spid="275" grpId="5"/>
-      <p:bldP build="whole" bldLvl="1" animBg="1" rev="0" advAuto="0" spid="276" grpId="6"/>
-      <p:bldP build="whole" bldLvl="1" animBg="1" rev="0" advAuto="0" spid="271" grpId="1"/>
-      <p:bldP build="whole" bldLvl="1" animBg="1" rev="0" advAuto="0" spid="277" grpId="3"/>
-      <p:bldP build="whole" bldLvl="1" animBg="1" rev="0" advAuto="0" spid="273" grpId="2"/>
-      <p:bldP build="whole" bldLvl="1" animBg="1" rev="0" advAuto="0" spid="275" grpId="4"/>
     </p:bldLst>
   </p:timing>
 </p:sld>
@@ -17890,13 +17890,13 @@
       </p:par>
     </p:tnLst>
     <p:bldLst>
-      <p:bldP build="whole" bldLvl="1" animBg="1" rev="0" advAuto="0" spid="289" grpId="7"/>
-      <p:bldP build="whole" bldLvl="1" animBg="1" rev="0" advAuto="0" spid="282" grpId="1"/>
+      <p:bldP build="whole" bldLvl="1" animBg="1" rev="0" advAuto="0" spid="288" grpId="3"/>
       <p:bldP build="whole" bldLvl="1" animBg="1" rev="0" advAuto="0" spid="284" grpId="2"/>
-      <p:bldP build="whole" bldLvl="1" animBg="1" rev="0" advAuto="0" spid="288" grpId="3"/>
-      <p:bldP build="whole" bldLvl="1" animBg="1" rev="0" advAuto="0" spid="287" grpId="6"/>
       <p:bldP build="whole" bldLvl="1" animBg="1" rev="0" advAuto="0" spid="286" grpId="4"/>
       <p:bldP build="whole" bldLvl="1" animBg="1" rev="0" advAuto="0" spid="286" grpId="5"/>
+      <p:bldP build="whole" bldLvl="1" animBg="1" rev="0" advAuto="0" spid="289" grpId="7"/>
+      <p:bldP build="whole" bldLvl="1" animBg="1" rev="0" advAuto="0" spid="287" grpId="6"/>
+      <p:bldP build="whole" bldLvl="1" animBg="1" rev="0" advAuto="0" spid="282" grpId="1"/>
     </p:bldLst>
   </p:timing>
 </p:sld>
@@ -18406,9 +18406,9 @@
       </p:par>
     </p:tnLst>
     <p:bldLst>
+      <p:bldP build="whole" bldLvl="1" animBg="1" rev="0" advAuto="0" spid="298" grpId="3"/>
+      <p:bldP build="whole" bldLvl="1" animBg="1" rev="0" advAuto="0" spid="296" grpId="2"/>
       <p:bldP build="whole" bldLvl="1" animBg="1" rev="0" advAuto="0" spid="295" grpId="1"/>
-      <p:bldP build="whole" bldLvl="1" animBg="1" rev="0" advAuto="0" spid="296" grpId="2"/>
-      <p:bldP build="whole" bldLvl="1" animBg="1" rev="0" advAuto="0" spid="298" grpId="3"/>
     </p:bldLst>
   </p:timing>
 </p:sld>
@@ -19608,9 +19608,9 @@
       </p:par>
     </p:tnLst>
     <p:bldLst>
+      <p:bldP build="whole" bldLvl="1" animBg="1" rev="0" advAuto="0" spid="313" grpId="3"/>
       <p:bldP build="whole" bldLvl="1" animBg="1" rev="0" advAuto="0" spid="311" grpId="2"/>
       <p:bldP build="whole" bldLvl="1" animBg="1" rev="0" advAuto="0" spid="310" grpId="1"/>
-      <p:bldP build="whole" bldLvl="1" animBg="1" rev="0" advAuto="0" spid="313" grpId="3"/>
     </p:bldLst>
   </p:timing>
 </p:sld>
@@ -21319,11 +21319,11 @@
       </p:par>
     </p:tnLst>
     <p:bldLst>
-      <p:bldP build="whole" bldLvl="1" animBg="1" rev="0" advAuto="0" spid="133" grpId="5"/>
-      <p:bldP build="whole" bldLvl="1" animBg="1" rev="0" advAuto="0" spid="129" grpId="2"/>
       <p:bldP build="whole" bldLvl="1" animBg="1" rev="0" advAuto="0" spid="130" grpId="3"/>
       <p:bldP build="whole" bldLvl="1" animBg="1" rev="0" advAuto="0" spid="128" grpId="1"/>
+      <p:bldP build="whole" bldLvl="1" animBg="1" rev="0" advAuto="0" spid="133" grpId="5"/>
       <p:bldP build="whole" bldLvl="1" animBg="1" rev="0" advAuto="0" spid="131" grpId="4"/>
+      <p:bldP build="whole" bldLvl="1" animBg="1" rev="0" advAuto="0" spid="129" grpId="2"/>
     </p:bldLst>
   </p:timing>
 </p:sld>
@@ -22976,12 +22976,12 @@
       </p:par>
     </p:tnLst>
     <p:bldLst>
-      <p:bldP build="whole" bldLvl="1" animBg="1" rev="0" advAuto="0" spid="137" grpId="1"/>
-      <p:bldP build="whole" bldLvl="1" animBg="1" rev="0" advAuto="0" spid="138" grpId="6"/>
-      <p:bldP build="whole" bldLvl="1" animBg="1" rev="0" advAuto="0" spid="137" grpId="3"/>
       <p:bldP build="whole" bldLvl="1" animBg="1" rev="0" advAuto="0" spid="140" grpId="7"/>
       <p:bldP build="whole" bldLvl="1" animBg="1" rev="0" advAuto="0" spid="139" grpId="2"/>
+      <p:bldP build="whole" bldLvl="1" animBg="1" rev="0" advAuto="0" spid="137" grpId="1"/>
+      <p:bldP build="whole" bldLvl="1" animBg="1" rev="0" advAuto="0" spid="137" grpId="3"/>
       <p:bldP build="whole" bldLvl="1" animBg="1" rev="0" advAuto="0" spid="139" grpId="4"/>
+      <p:bldP build="whole" bldLvl="1" animBg="1" rev="0" advAuto="0" spid="138" grpId="6"/>
     </p:bldLst>
   </p:timing>
 </p:sld>
@@ -24120,10 +24120,10 @@
       </p:par>
     </p:tnLst>
     <p:bldLst>
+      <p:bldP build="whole" bldLvl="1" animBg="1" rev="0" advAuto="0" spid="146" grpId="7"/>
       <p:bldP build="whole" bldLvl="1" animBg="1" rev="0" advAuto="0" spid="145" grpId="1"/>
       <p:bldP build="whole" bldLvl="1" animBg="1" rev="0" advAuto="0" spid="147" grpId="5"/>
       <p:bldP build="whole" bldLvl="1" animBg="1" rev="0" advAuto="0" spid="147" grpId="6"/>
-      <p:bldP build="whole" bldLvl="1" animBg="1" rev="0" advAuto="0" spid="146" grpId="7"/>
     </p:bldLst>
   </p:timing>
 </p:sld>
@@ -25528,10 +25528,10 @@
       </p:par>
     </p:tnLst>
     <p:bldLst>
-      <p:bldP build="whole" bldLvl="1" animBg="1" rev="0" advAuto="0" spid="159" grpId="4"/>
       <p:bldP build="whole" bldLvl="1" animBg="1" rev="0" advAuto="0" spid="156" grpId="1"/>
       <p:bldP build="whole" bldLvl="1" animBg="1" rev="0" advAuto="0" spid="156" grpId="2"/>
       <p:bldP build="whole" bldLvl="1" animBg="1" rev="0" advAuto="0" spid="158" grpId="3"/>
+      <p:bldP build="whole" bldLvl="1" animBg="1" rev="0" advAuto="0" spid="159" grpId="4"/>
     </p:bldLst>
   </p:timing>
 </p:sld>
@@ -26285,12 +26285,12 @@
       </p:par>
     </p:tnLst>
     <p:bldLst>
+      <p:bldP build="whole" bldLvl="1" animBg="1" rev="0" advAuto="0" spid="166" grpId="4"/>
+      <p:bldP build="whole" bldLvl="1" animBg="1" rev="0" advAuto="0" spid="167" grpId="6"/>
+      <p:bldP build="whole" bldLvl="1" animBg="1" rev="0" advAuto="0" spid="168" grpId="3"/>
+      <p:bldP build="whole" bldLvl="1" animBg="1" rev="0" advAuto="0" spid="169" grpId="5"/>
+      <p:bldP build="whole" bldLvl="1" animBg="1" rev="0" advAuto="0" spid="165" grpId="2"/>
       <p:bldP build="whole" bldLvl="1" animBg="1" rev="0" advAuto="0" spid="170" grpId="7"/>
-      <p:bldP build="whole" bldLvl="1" animBg="1" rev="0" advAuto="0" spid="168" grpId="3"/>
-      <p:bldP build="whole" bldLvl="1" animBg="1" rev="0" advAuto="0" spid="165" grpId="2"/>
-      <p:bldP build="whole" bldLvl="1" animBg="1" rev="0" advAuto="0" spid="167" grpId="6"/>
-      <p:bldP build="whole" bldLvl="1" animBg="1" rev="0" advAuto="0" spid="166" grpId="4"/>
-      <p:bldP build="whole" bldLvl="1" animBg="1" rev="0" advAuto="0" spid="169" grpId="5"/>
     </p:bldLst>
   </p:timing>
 </p:sld>

</xml_diff>